<commit_message>
Spring data first code Lab. Not working
</commit_message>
<xml_diff>
--- a/26.03.2018 - Spring Data Intro - Lab/08. DB-Advanced-Spring-Data-Intro.pptx
+++ b/26.03.2018 - Spring Data Intro - Lab/08. DB-Advanced-Spring-Data-Intro.pptx
@@ -325,7 +325,7 @@
             <a:fld id="{FE5B4EDC-59C0-49C7-8ADA-5A781B329E02}" type="datetimeFigureOut">
               <a:rPr lang="en-US"/>
               <a:pPr/>
-              <a:t>3/26/2018</a:t>
+              <a:t>3/28/2018</a:t>
             </a:fld>
             <a:endParaRPr dirty="0"/>
           </a:p>
@@ -524,7 +524,7 @@
             <a:fld id="{F2D8D46A-B586-417D-BFBD-8C8FE0AAF762}" type="datetimeFigureOut">
               <a:rPr lang="en-US" smtClean="0"/>
               <a:pPr/>
-              <a:t>3/26/2018</a:t>
+              <a:t>3/28/2018</a:t>
             </a:fld>
             <a:endParaRPr lang="en-US"/>
           </a:p>
@@ -3419,7 +3419,7 @@
             <a:fld id="{055373AC-9AA7-423B-BA00-BA1C74164DBD}" type="datetime1">
               <a:rPr lang="en-US" smtClean="0"/>
               <a:pPr/>
-              <a:t>3/26/2018</a:t>
+              <a:t>3/28/2018</a:t>
             </a:fld>
             <a:endParaRPr lang="en-US" dirty="0"/>
           </a:p>
@@ -4764,7 +4764,7 @@
             <a:fld id="{055373AC-9AA7-423B-BA00-BA1C74164DBD}" type="datetime1">
               <a:rPr lang="en-US" smtClean="0"/>
               <a:pPr/>
-              <a:t>3/26/2018</a:t>
+              <a:t>3/28/2018</a:t>
             </a:fld>
             <a:endParaRPr lang="en-US" dirty="0"/>
           </a:p>
@@ -14641,8 +14641,8 @@
           </a:p>
         </p:txBody>
       </p:sp>
-      <mc:AlternateContent xmlns:mc="http://schemas.openxmlformats.org/markup-compatibility/2006" xmlns:psez="http://schemas.microsoft.com/office/powerpoint/2016/sectionzoom">
-        <mc:Choice Requires="psez">
+      <mc:AlternateContent xmlns:mc="http://schemas.openxmlformats.org/markup-compatibility/2006">
+        <mc:Choice xmlns:psez="http://schemas.microsoft.com/office/powerpoint/2016/sectionzoom" xmlns="" Requires="psez">
           <p:graphicFrame>
             <p:nvGraphicFramePr>
               <p:cNvPr id="3" name="Мащабиране на раздел 2">
@@ -14699,7 +14699,7 @@
             </a:graphic>
           </p:graphicFrame>
         </mc:Choice>
-        <mc:Fallback xmlns="">
+        <mc:Fallback>
           <p:pic>
             <p:nvPicPr>
               <p:cNvPr id="3" name="Мащабиране на раздел 2">
@@ -14738,8 +14738,8 @@
           </p:pic>
         </mc:Fallback>
       </mc:AlternateContent>
-      <mc:AlternateContent xmlns:mc="http://schemas.openxmlformats.org/markup-compatibility/2006" xmlns:psez="http://schemas.microsoft.com/office/powerpoint/2016/sectionzoom">
-        <mc:Choice Requires="psez">
+      <mc:AlternateContent xmlns:mc="http://schemas.openxmlformats.org/markup-compatibility/2006">
+        <mc:Choice xmlns:psez="http://schemas.microsoft.com/office/powerpoint/2016/sectionzoom" xmlns="" Requires="psez">
           <p:graphicFrame>
             <p:nvGraphicFramePr>
               <p:cNvPr id="5" name="Мащабиране на раздел 4">
@@ -14796,7 +14796,7 @@
             </a:graphic>
           </p:graphicFrame>
         </mc:Choice>
-        <mc:Fallback xmlns="">
+        <mc:Fallback>
           <p:pic>
             <p:nvPicPr>
               <p:cNvPr id="5" name="Мащабиране на раздел 4">
@@ -14835,8 +14835,8 @@
           </p:pic>
         </mc:Fallback>
       </mc:AlternateContent>
-      <mc:AlternateContent xmlns:mc="http://schemas.openxmlformats.org/markup-compatibility/2006" xmlns:psez="http://schemas.microsoft.com/office/powerpoint/2016/sectionzoom">
-        <mc:Choice Requires="psez">
+      <mc:AlternateContent xmlns:mc="http://schemas.openxmlformats.org/markup-compatibility/2006">
+        <mc:Choice xmlns:psez="http://schemas.microsoft.com/office/powerpoint/2016/sectionzoom" xmlns="" Requires="psez">
           <p:graphicFrame>
             <p:nvGraphicFramePr>
               <p:cNvPr id="7" name="Мащабиране на раздел 6">
@@ -14893,7 +14893,7 @@
             </a:graphic>
           </p:graphicFrame>
         </mc:Choice>
-        <mc:Fallback xmlns="">
+        <mc:Fallback>
           <p:pic>
             <p:nvPicPr>
               <p:cNvPr id="7" name="Мащабиране на раздел 6">
@@ -14932,8 +14932,8 @@
           </p:pic>
         </mc:Fallback>
       </mc:AlternateContent>
-      <mc:AlternateContent xmlns:mc="http://schemas.openxmlformats.org/markup-compatibility/2006" xmlns:psez="http://schemas.microsoft.com/office/powerpoint/2016/sectionzoom">
-        <mc:Choice Requires="psez">
+      <mc:AlternateContent xmlns:mc="http://schemas.openxmlformats.org/markup-compatibility/2006">
+        <mc:Choice xmlns:psez="http://schemas.microsoft.com/office/powerpoint/2016/sectionzoom" xmlns="" Requires="psez">
           <p:graphicFrame>
             <p:nvGraphicFramePr>
               <p:cNvPr id="10" name="Мащабиране на раздел 9">
@@ -14990,7 +14990,7 @@
             </a:graphic>
           </p:graphicFrame>
         </mc:Choice>
-        <mc:Fallback xmlns="">
+        <mc:Fallback>
           <p:pic>
             <p:nvPicPr>
               <p:cNvPr id="10" name="Мащабиране на раздел 9">
@@ -25739,6 +25739,10 @@
               </a:rPr>
               <a:t>sli.do</a:t>
             </a:r>
+            <a:r>
+              <a:rPr lang="en-US" sz="6000" b="1" dirty="0"/>
+              <a:t/>
+            </a:r>
             <a:br>
               <a:rPr lang="en-US" sz="6000" b="1" dirty="0"/>
             </a:br>

</xml_diff>